<commit_message>
introdução (documentação) e mais ajustes na tela
</commit_message>
<xml_diff>
--- a/Documentação/Senac_BEC_2s2018_SUA_PID.pptx
+++ b/Documentação/Senac_BEC_2s2018_SUA_PID.pptx
@@ -4553,7 +4553,7 @@
         <p:spPr>
           <a:xfrm>
             <a:off x="228568" y="3186090"/>
-            <a:ext cx="4500594" cy="2862322"/>
+            <a:ext cx="4500594" cy="2492990"/>
           </a:xfrm>
           <a:prstGeom prst="rect">
             <a:avLst/>
@@ -4589,18 +4589,22 @@
                 <a:latin typeface="Arial" pitchFamily="34" charset="0"/>
                 <a:cs typeface="Arial" pitchFamily="34" charset="0"/>
               </a:rPr>
-              <a:t>	Há cada vez mais um grande interesse de profissionais do esporte em equipamentos de análise de performance pois os auxiliam em aperfeiçoar atletas. </a:t>
+              <a:t>	A utilidade da localização de pessoas e aparelhos vem se aperfeiçoando cada vez mais com a evolução de programas e aplicativos que utilizam-se deste recurso, seja para trazer mais mobilidade no trânsito ou para simplificar a procura de um restaurante mais próximo, por exemplo.</a:t>
             </a:r>
           </a:p>
           <a:p>
             <a:pPr algn="just"/>
             <a:r>
-              <a:rPr lang="pt-BR" sz="1200" dirty="0">
+              <a:rPr lang="pt-BR" sz="1200">
                 <a:latin typeface="Arial" pitchFamily="34" charset="0"/>
                 <a:cs typeface="Arial" pitchFamily="34" charset="0"/>
               </a:rPr>
-              <a:t>	O projeto consiste num protótipo para a área de análise de performance de atletas, de fácil uso (plug-n-play) e independente de internet, focado na medição do tempo durante um percurso seja entre setores, entre dois equipamentos, seja do tempo total. A partir desses tempos medidos é calculado a velocidade e aceleração entre os setores e suas médias garantindo o máximo de acurácia e precisão, sendo todas essas informações mostradas numa interface. Dessa forma, quando um profissional adequado analisar essas informações e aplicá-las nos treinos, poderá melhorar a performance de um atleta.</a:t>
-            </a:r>
+              <a:t>	Com a baixa efetividade da localização por GPS em lugares fechados, somada a evolução dos microcontroladores, a localização indoor acaba se tornando alvo de pesquisas e projetos por ser bastante relevante em ambientes grandes e fechados onde a vida de muitas pessoas seria facilitada por ter como se situar, e onde seria possível monitorar funcionários dentro de uma empresa. </a:t>
+            </a:r>
+            <a:endParaRPr lang="pt-BR" sz="1200" dirty="0">
+              <a:latin typeface="Arial" pitchFamily="34" charset="0"/>
+              <a:cs typeface="Arial" pitchFamily="34" charset="0"/>
+            </a:endParaRPr>
           </a:p>
         </p:txBody>
       </p:sp>
@@ -4656,7 +4660,7 @@
                 <a:latin typeface="Arial" pitchFamily="34" charset="0"/>
                 <a:cs typeface="Arial" pitchFamily="34" charset="0"/>
               </a:rPr>
-              <a:t>A partir dos desafios propostos, apenas sabemos a localização da sala e o andar que o funcionário se encontra, embora alguns ajustes ainda necessitam serem realizados. Os dados captados pelo protótipo, pode ser consultado por um dispositivo qualquer com acesso a internet e é possível saber onde a pessoa se encontra dentro da sala, embora apresenta um grande erro relacionado a localização do mesmo. Portanto, necessitaria da análise da onda emitida pela esp8266 e com isto verificar em como efetuar leituras precisas para gerar uma melhor localização.</a:t>
+              <a:t>A partir dos desafios propostos, apenas sabemos a localização da sala e o andar que o funcionário se encontra, embora alguns ajustes ainda necessitam ser realizados. Os dados captados pelo protótipo, pode ser consultado por um dispositivo qualquer com acesso a internet e é possível saber onde a pessoa se encontra dentro da sala, embora apresentando um grande erro relacionado a localização do mesmo. Portanto, necessitaria da análise da onda emitida pela esp8266 e, junto à isto, verificar como efetuar leituras precisas a fim de gerar uma localização mais exata.</a:t>
             </a:r>
           </a:p>
         </p:txBody>
@@ -4797,7 +4801,7 @@
                 <a:latin typeface="Arial" pitchFamily="34" charset="0"/>
                 <a:cs typeface="Arial" pitchFamily="34" charset="0"/>
               </a:rPr>
-              <a:t>A partir dos dados gerados pelo protótipo é possível analisar que a precisão de localizar uma pessoa fica fora do que seria considerado razoável para a localização </a:t>
+              <a:t>A partir dos dados gerados pelo protótipo é possível analisar que a precisão da localização de uma pessoa fica fora do que seria considerado razoável para a localização </a:t>
             </a:r>
             <a:r>
               <a:rPr lang="pt-BR" sz="1200" dirty="0" err="1">
@@ -4817,7 +4821,7 @@
                 <a:latin typeface="Arial" pitchFamily="34" charset="0"/>
                 <a:cs typeface="Arial" pitchFamily="34" charset="0"/>
               </a:rPr>
-              <a:t> devido a fatores externos e análise do sinal gerado pela esp8266. Contudo, o protótipo é capaz de saber a sala e o andar que a pessoa estaria e com isto pode ser identificado se a pessoa é ou não funcionário da empresa.</a:t>
+              <a:t> devido a fatores externos e análise do sinal gerado pela esp8266. Contudo, o protótipo é capaz de localizar a sala e o andar que a pessoa estaria e com isto pode ser identificado se a pessoa é ou não funcionário da empresa.</a:t>
             </a:r>
           </a:p>
         </p:txBody>

</xml_diff>

<commit_message>
Falta diagrama de software e revisão do Luiz p/ concordar
</commit_message>
<xml_diff>
--- a/Documentação/Senac_BEC_2s2018_SUA_PID.pptx
+++ b/Documentação/Senac_BEC_2s2018_SUA_PID.pptx
@@ -4650,17 +4650,7 @@
                 <a:latin typeface="Arial" pitchFamily="34" charset="0"/>
                 <a:cs typeface="Arial" pitchFamily="34" charset="0"/>
               </a:rPr>
-              <a:t>	</a:t>
-            </a:r>
-            <a:r>
-              <a:rPr lang="pt-BR" sz="1200" dirty="0">
-                <a:solidFill>
-                  <a:srgbClr val="FF0000"/>
-                </a:solidFill>
-                <a:latin typeface="Arial" pitchFamily="34" charset="0"/>
-                <a:cs typeface="Arial" pitchFamily="34" charset="0"/>
-              </a:rPr>
-              <a:t>A partir dos desafios propostos, apenas sabemos a localização da sala e o andar que o funcionário se encontra, embora alguns ajustes ainda necessitam ser realizados. Os dados captados pelo protótipo, pode ser consultado por um dispositivo qualquer com acesso a internet e é possível saber onde a pessoa se encontra dentro da sala, embora apresentando um grande erro relacionado a localização do mesmo. Portanto, necessitaria da análise da onda emitida pela esp8266 e, junto à isto, verificar como efetuar leituras precisas a fim de gerar uma localização mais exata.</a:t>
+              <a:t>	A partir dos desafios propostos, apenas sabemos a localização da sala e o andar que o funcionário se encontra, embora alguns ajustes ainda necessitam ser realizados. Os dados captados pelo protótipo, pode ser consultado por um dispositivo qualquer com acesso a internet e é possível saber onde a pessoa se encontra dentro da sala, embora apresentando um grande erro relacionado a localização do mesmo. Portanto, necessitaria da análise da onda emitida pela esp8266 e, junto à isto, verificar como efetuar leituras precisas a fim de gerar uma localização mais exata.</a:t>
             </a:r>
           </a:p>
         </p:txBody>
@@ -4673,7 +4663,7 @@
         </p:nvSpPr>
         <p:spPr>
           <a:xfrm>
-            <a:off x="194652" y="5843024"/>
+            <a:off x="194652" y="5748574"/>
             <a:ext cx="4500594" cy="1569660"/>
           </a:xfrm>
           <a:prstGeom prst="rect">
@@ -4707,23 +4697,10 @@
                 <a:latin typeface="Arial" pitchFamily="34" charset="0"/>
                 <a:cs typeface="Arial" pitchFamily="34" charset="0"/>
               </a:rPr>
-              <a:t>	</a:t>
-            </a:r>
-            <a:r>
-              <a:rPr lang="pt-BR" sz="1200" dirty="0">
-                <a:solidFill>
-                  <a:srgbClr val="FF0000"/>
-                </a:solidFill>
-                <a:latin typeface="Arial" pitchFamily="34" charset="0"/>
-                <a:cs typeface="Arial" pitchFamily="34" charset="0"/>
-              </a:rPr>
-              <a:t>Desenvolver um protótipo com a finalidade de localização </a:t>
+              <a:t>	Desenvolver um protótipo com a finalidade de localização </a:t>
             </a:r>
             <a:r>
               <a:rPr lang="pt-BR" sz="1200" dirty="0" err="1">
-                <a:solidFill>
-                  <a:srgbClr val="FF0000"/>
-                </a:solidFill>
                 <a:latin typeface="Arial" pitchFamily="34" charset="0"/>
                 <a:cs typeface="Arial" pitchFamily="34" charset="0"/>
               </a:rPr>
@@ -4731,18 +4708,12 @@
             </a:r>
             <a:r>
               <a:rPr lang="pt-BR" sz="1200" dirty="0">
-                <a:solidFill>
-                  <a:srgbClr val="FF0000"/>
-                </a:solidFill>
                 <a:latin typeface="Arial" pitchFamily="34" charset="0"/>
                 <a:cs typeface="Arial" pitchFamily="34" charset="0"/>
               </a:rPr>
               <a:t> dos funcionários em salas e andares através da potência do sinal (rede WiFi) que os esp8266 transmitem. O sinal captado será enviado para um servidor que efetuaria os cálculos e mostrará o resultado através de uma tela via web para visualização de qualquer dispositivo que esteja conectado na internet.</a:t>
             </a:r>
             <a:endParaRPr lang="pt-BR" sz="2800" dirty="0">
-              <a:solidFill>
-                <a:srgbClr val="FF0000"/>
-              </a:solidFill>
               <a:latin typeface="Arial" panose="020B0604020202020204" pitchFamily="34" charset="0"/>
               <a:cs typeface="Arial" pitchFamily="34" charset="0"/>
             </a:endParaRPr>
@@ -4791,23 +4762,10 @@
                 <a:latin typeface="Arial" pitchFamily="34" charset="0"/>
                 <a:cs typeface="Arial" pitchFamily="34" charset="0"/>
               </a:rPr>
-              <a:t>	</a:t>
-            </a:r>
-            <a:r>
-              <a:rPr lang="pt-BR" sz="1200" dirty="0">
-                <a:solidFill>
-                  <a:srgbClr val="FF0000"/>
-                </a:solidFill>
-                <a:latin typeface="Arial" pitchFamily="34" charset="0"/>
-                <a:cs typeface="Arial" pitchFamily="34" charset="0"/>
-              </a:rPr>
-              <a:t>A partir dos dados gerados pelo protótipo é possível analisar que a precisão da localização de uma pessoa fica fora do que seria considerado razoável para a localização </a:t>
+              <a:t>	A partir dos dados gerados pelo protótipo é possível analisar que a precisão da localização de uma pessoa fica fora do que seria considerado razoável para a localização </a:t>
             </a:r>
             <a:r>
               <a:rPr lang="pt-BR" sz="1200" dirty="0" err="1">
-                <a:solidFill>
-                  <a:srgbClr val="FF0000"/>
-                </a:solidFill>
                 <a:latin typeface="Arial" pitchFamily="34" charset="0"/>
                 <a:cs typeface="Arial" pitchFamily="34" charset="0"/>
               </a:rPr>
@@ -4815,9 +4773,6 @@
             </a:r>
             <a:r>
               <a:rPr lang="pt-BR" sz="1200" dirty="0">
-                <a:solidFill>
-                  <a:srgbClr val="FF0000"/>
-                </a:solidFill>
                 <a:latin typeface="Arial" pitchFamily="34" charset="0"/>
                 <a:cs typeface="Arial" pitchFamily="34" charset="0"/>
               </a:rPr>
@@ -4864,17 +4819,7 @@
                 <a:latin typeface="Arial" pitchFamily="34" charset="0"/>
                 <a:cs typeface="Arial" pitchFamily="34" charset="0"/>
               </a:rPr>
-              <a:t>	</a:t>
-            </a:r>
-            <a:r>
-              <a:rPr lang="pt-BR" sz="1200" dirty="0">
-                <a:solidFill>
-                  <a:srgbClr val="FF0000"/>
-                </a:solidFill>
-                <a:latin typeface="Arial" pitchFamily="34" charset="0"/>
-                <a:cs typeface="Arial" pitchFamily="34" charset="0"/>
-              </a:rPr>
-              <a:t>Na realização do projeto, foram avaliados os riscos que ocorreriam em relação ao erro de localização das pessoas em uma sala, fatores externos que influenciam na captação da potência do sinal, análise das ondas emitidas pelos os mesmo e localização em qual sala e andar as pessoas estariam. Com isto verificou-se os equipamentos necessários para análise, métodos matemáticos e algoritmos que poderiam ser aplicados no auxílio  estado do protótipo para atender seus desafios que foram relacionados como riscos. E assim, foi iniciada a etapa de desenvolvimento em duas frentes: hardware e software.</a:t>
+              <a:t>	Na realização do projeto, foram avaliados os riscos que ocorreriam em relação ao erro de localização das pessoas em uma sala, fatores externos que influenciam na captação da potência do sinal, análise das ondas emitidas pelos os mesmo e localização em qual sala e andar as pessoas estariam. Com isto verificou-se os equipamentos necessários para análise, métodos matemáticos e algoritmos que poderiam ser aplicados no auxílio  estado do protótipo para atender seus desafios que foram relacionados como riscos. E assim, foi iniciada a etapa de desenvolvimento em duas frentes: hardware e software.</a:t>
             </a:r>
           </a:p>
         </p:txBody>
@@ -4887,8 +4832,8 @@
         </p:nvSpPr>
         <p:spPr>
           <a:xfrm>
-            <a:off x="4786346" y="10939688"/>
-            <a:ext cx="4500594" cy="276999"/>
+            <a:off x="4781936" y="10760448"/>
+            <a:ext cx="4500594" cy="1754326"/>
           </a:xfrm>
           <a:prstGeom prst="rect">
             <a:avLst/>
@@ -4909,19 +4854,1436 @@
               </a:rPr>
               <a:t>REFERÊNCIAS</a:t>
             </a:r>
-            <a:endParaRPr lang="pt-BR" sz="1200" dirty="0">
+          </a:p>
+          <a:p>
+            <a:pPr algn="just"/>
+            <a:r>
+              <a:rPr lang="pt-BR" sz="1200" dirty="0" err="1">
+                <a:latin typeface="Times New Roman" panose="02020603050405020304" pitchFamily="18" charset="0"/>
+                <a:cs typeface="Times New Roman" panose="02020603050405020304" pitchFamily="18" charset="0"/>
+              </a:rPr>
+              <a:t>An</a:t>
+            </a:r>
+            <a:r>
+              <a:rPr lang="pt-BR" sz="1200" dirty="0">
+                <a:latin typeface="Times New Roman" panose="02020603050405020304" pitchFamily="18" charset="0"/>
+                <a:cs typeface="Times New Roman" panose="02020603050405020304" pitchFamily="18" charset="0"/>
+              </a:rPr>
+              <a:t> </a:t>
+            </a:r>
+            <a:r>
+              <a:rPr lang="pt-BR" sz="1200" dirty="0" err="1">
+                <a:latin typeface="Times New Roman" panose="02020603050405020304" pitchFamily="18" charset="0"/>
+                <a:cs typeface="Times New Roman" panose="02020603050405020304" pitchFamily="18" charset="0"/>
+              </a:rPr>
+              <a:t>Introduction</a:t>
+            </a:r>
+            <a:r>
+              <a:rPr lang="pt-BR" sz="1200" dirty="0">
+                <a:latin typeface="Times New Roman" panose="02020603050405020304" pitchFamily="18" charset="0"/>
+                <a:cs typeface="Times New Roman" panose="02020603050405020304" pitchFamily="18" charset="0"/>
+              </a:rPr>
+              <a:t> </a:t>
+            </a:r>
+            <a:r>
+              <a:rPr lang="pt-BR" sz="1200" dirty="0" err="1">
+                <a:latin typeface="Times New Roman" panose="02020603050405020304" pitchFamily="18" charset="0"/>
+                <a:cs typeface="Times New Roman" panose="02020603050405020304" pitchFamily="18" charset="0"/>
+              </a:rPr>
+              <a:t>Maths</a:t>
+            </a:r>
+            <a:r>
+              <a:rPr lang="pt-BR" sz="1200" dirty="0">
+                <a:latin typeface="Times New Roman" panose="02020603050405020304" pitchFamily="18" charset="0"/>
+                <a:cs typeface="Times New Roman" panose="02020603050405020304" pitchFamily="18" charset="0"/>
+              </a:rPr>
+              <a:t> </a:t>
+            </a:r>
+            <a:r>
+              <a:rPr lang="pt-BR" sz="1200" dirty="0" err="1">
+                <a:latin typeface="Times New Roman" panose="02020603050405020304" pitchFamily="18" charset="0"/>
+                <a:cs typeface="Times New Roman" panose="02020603050405020304" pitchFamily="18" charset="0"/>
+              </a:rPr>
+              <a:t>of</a:t>
+            </a:r>
+            <a:r>
+              <a:rPr lang="pt-BR" sz="1200" dirty="0">
+                <a:latin typeface="Times New Roman" panose="02020603050405020304" pitchFamily="18" charset="0"/>
+                <a:cs typeface="Times New Roman" panose="02020603050405020304" pitchFamily="18" charset="0"/>
+              </a:rPr>
+              <a:t> Global </a:t>
+            </a:r>
+            <a:r>
+              <a:rPr lang="pt-BR" sz="1200" dirty="0" err="1">
+                <a:latin typeface="Times New Roman" panose="02020603050405020304" pitchFamily="18" charset="0"/>
+                <a:cs typeface="Times New Roman" panose="02020603050405020304" pitchFamily="18" charset="0"/>
+              </a:rPr>
+              <a:t>Posg</a:t>
+            </a:r>
+            <a:r>
+              <a:rPr lang="pt-BR" sz="1200" dirty="0">
+                <a:latin typeface="Times New Roman" panose="02020603050405020304" pitchFamily="18" charset="0"/>
+                <a:cs typeface="Times New Roman" panose="02020603050405020304" pitchFamily="18" charset="0"/>
+              </a:rPr>
+              <a:t> Systems. Disponível em: &lt;</a:t>
+            </a:r>
+            <a:r>
+              <a:rPr lang="pt-BR" sz="1200" dirty="0">
+                <a:latin typeface="Times New Roman" panose="02020603050405020304" pitchFamily="18" charset="0"/>
+                <a:cs typeface="Times New Roman" panose="02020603050405020304" pitchFamily="18" charset="0"/>
+                <a:hlinkClick r:id="rId4">
+                  <a:extLst>
+                    <a:ext uri="{A12FA001-AC4F-418D-AE19-62706E023703}">
+                      <ahyp:hlinkClr xmlns:ahyp="http://schemas.microsoft.com/office/drawing/2018/hyperlinkcolor" val="tx"/>
+                    </a:ext>
+                  </a:extLst>
+                </a:hlinkClick>
+              </a:rPr>
+              <a:t> </a:t>
+            </a:r>
+            <a:r>
+              <a:rPr lang="pt-BR" sz="1200" dirty="0">
+                <a:latin typeface="Times New Roman" panose="02020603050405020304" pitchFamily="18" charset="0"/>
+                <a:cs typeface="Times New Roman" panose="02020603050405020304" pitchFamily="18" charset="0"/>
+              </a:rPr>
+              <a:t>http://jwilson.coe.uga.edu/EMAT6680Fa05/Schultz/6690/Barn_GPS/Barn_GPS.html</a:t>
+            </a:r>
+          </a:p>
+          <a:p>
+            <a:pPr algn="just"/>
+            <a:r>
+              <a:rPr lang="pt-BR" sz="1200" dirty="0">
+                <a:latin typeface="Times New Roman" panose="02020603050405020304" pitchFamily="18" charset="0"/>
+                <a:cs typeface="Times New Roman" panose="02020603050405020304" pitchFamily="18" charset="0"/>
+                <a:hlinkClick r:id="rId4">
+                  <a:extLst>
+                    <a:ext uri="{A12FA001-AC4F-418D-AE19-62706E023703}">
+                      <ahyp:hlinkClr xmlns:ahyp="http://schemas.microsoft.com/office/drawing/2018/hyperlinkcolor" val="tx"/>
+                    </a:ext>
+                  </a:extLst>
+                </a:hlinkClick>
+              </a:rPr>
+              <a:t>&gt;. Acesso</a:t>
+            </a:r>
+            <a:r>
+              <a:rPr lang="pt-BR" sz="1200" dirty="0">
+                <a:latin typeface="Times New Roman" panose="02020603050405020304" pitchFamily="18" charset="0"/>
+                <a:cs typeface="Times New Roman" panose="02020603050405020304" pitchFamily="18" charset="0"/>
+              </a:rPr>
+              <a:t> em: 15 set. 2018.</a:t>
+            </a:r>
+          </a:p>
+          <a:p>
+            <a:pPr algn="just"/>
+            <a:r>
+              <a:rPr lang="pt-BR" sz="1200" dirty="0">
+                <a:latin typeface="Times New Roman" panose="02020603050405020304" pitchFamily="18" charset="0"/>
+                <a:cs typeface="Times New Roman" panose="02020603050405020304" pitchFamily="18" charset="0"/>
+              </a:rPr>
+              <a:t>Indoor </a:t>
+            </a:r>
+            <a:r>
+              <a:rPr lang="pt-BR" sz="1200" dirty="0" err="1">
+                <a:latin typeface="Times New Roman" panose="02020603050405020304" pitchFamily="18" charset="0"/>
+                <a:cs typeface="Times New Roman" panose="02020603050405020304" pitchFamily="18" charset="0"/>
+              </a:rPr>
+              <a:t>Localization</a:t>
+            </a:r>
+            <a:r>
+              <a:rPr lang="pt-BR" sz="1200" dirty="0">
+                <a:latin typeface="Times New Roman" panose="02020603050405020304" pitchFamily="18" charset="0"/>
+                <a:cs typeface="Times New Roman" panose="02020603050405020304" pitchFamily="18" charset="0"/>
+              </a:rPr>
+              <a:t> </a:t>
+            </a:r>
+            <a:r>
+              <a:rPr lang="pt-BR" sz="1200" dirty="0" err="1">
+                <a:latin typeface="Times New Roman" panose="02020603050405020304" pitchFamily="18" charset="0"/>
+                <a:cs typeface="Times New Roman" panose="02020603050405020304" pitchFamily="18" charset="0"/>
+              </a:rPr>
+              <a:t>Method</a:t>
+            </a:r>
+            <a:r>
+              <a:rPr lang="pt-BR" sz="1200" dirty="0">
+                <a:latin typeface="Times New Roman" panose="02020603050405020304" pitchFamily="18" charset="0"/>
+                <a:cs typeface="Times New Roman" panose="02020603050405020304" pitchFamily="18" charset="0"/>
+              </a:rPr>
+              <a:t> </a:t>
+            </a:r>
+            <a:r>
+              <a:rPr lang="pt-BR" sz="1200" dirty="0" err="1">
+                <a:latin typeface="Times New Roman" panose="02020603050405020304" pitchFamily="18" charset="0"/>
+                <a:cs typeface="Times New Roman" panose="02020603050405020304" pitchFamily="18" charset="0"/>
+              </a:rPr>
+              <a:t>Based</a:t>
+            </a:r>
+            <a:r>
+              <a:rPr lang="pt-BR" sz="1200" dirty="0">
+                <a:latin typeface="Times New Roman" panose="02020603050405020304" pitchFamily="18" charset="0"/>
+                <a:cs typeface="Times New Roman" panose="02020603050405020304" pitchFamily="18" charset="0"/>
+              </a:rPr>
+              <a:t> </a:t>
+            </a:r>
+            <a:r>
+              <a:rPr lang="pt-BR" sz="1200" dirty="0" err="1">
+                <a:latin typeface="Times New Roman" panose="02020603050405020304" pitchFamily="18" charset="0"/>
+                <a:cs typeface="Times New Roman" panose="02020603050405020304" pitchFamily="18" charset="0"/>
+              </a:rPr>
+              <a:t>on</a:t>
+            </a:r>
+            <a:r>
+              <a:rPr lang="pt-BR" sz="1200" dirty="0">
+                <a:latin typeface="Times New Roman" panose="02020603050405020304" pitchFamily="18" charset="0"/>
+                <a:cs typeface="Times New Roman" panose="02020603050405020304" pitchFamily="18" charset="0"/>
+              </a:rPr>
+              <a:t> Wi-Fi </a:t>
+            </a:r>
+            <a:r>
+              <a:rPr lang="pt-BR" sz="1200" dirty="0" err="1">
+                <a:latin typeface="Times New Roman" panose="02020603050405020304" pitchFamily="18" charset="0"/>
+                <a:cs typeface="Times New Roman" panose="02020603050405020304" pitchFamily="18" charset="0"/>
+              </a:rPr>
+              <a:t>Trilateration</a:t>
+            </a:r>
+            <a:r>
+              <a:rPr lang="pt-BR" sz="1200" dirty="0">
+                <a:latin typeface="Times New Roman" panose="02020603050405020304" pitchFamily="18" charset="0"/>
+                <a:cs typeface="Times New Roman" panose="02020603050405020304" pitchFamily="18" charset="0"/>
+              </a:rPr>
+              <a:t> </a:t>
+            </a:r>
+            <a:r>
+              <a:rPr lang="pt-BR" sz="1200" dirty="0" err="1">
+                <a:latin typeface="Times New Roman" panose="02020603050405020304" pitchFamily="18" charset="0"/>
+                <a:cs typeface="Times New Roman" panose="02020603050405020304" pitchFamily="18" charset="0"/>
+              </a:rPr>
+              <a:t>Technique</a:t>
+            </a:r>
+            <a:r>
+              <a:rPr lang="pt-BR" sz="1200" dirty="0">
+                <a:latin typeface="Times New Roman" panose="02020603050405020304" pitchFamily="18" charset="0"/>
+                <a:cs typeface="Times New Roman" panose="02020603050405020304" pitchFamily="18" charset="0"/>
+              </a:rPr>
+              <a:t>. Disponível em:</a:t>
+            </a:r>
+            <a:r>
+              <a:rPr lang="pt-BR" sz="1200" dirty="0">
+                <a:latin typeface="Times New Roman" panose="02020603050405020304" pitchFamily="18" charset="0"/>
+                <a:cs typeface="Times New Roman" panose="02020603050405020304" pitchFamily="18" charset="0"/>
+                <a:hlinkClick r:id="rId5">
+                  <a:extLst>
+                    <a:ext uri="{A12FA001-AC4F-418D-AE19-62706E023703}">
+                      <ahyp:hlinkClr xmlns:ahyp="http://schemas.microsoft.com/office/drawing/2018/hyperlinkcolor" val="tx"/>
+                    </a:ext>
+                  </a:extLst>
+                </a:hlinkClick>
+              </a:rPr>
+              <a:t> &lt;</a:t>
+            </a:r>
+            <a:r>
+              <a:rPr lang="pt-BR" sz="1200" dirty="0">
+                <a:latin typeface="Times New Roman" panose="02020603050405020304" pitchFamily="18" charset="0"/>
+                <a:cs typeface="Times New Roman" panose="02020603050405020304" pitchFamily="18" charset="0"/>
+              </a:rPr>
+              <a:t>https://pdfs.semanticscholar.org/e796/6215ebe9df591c43794dcff5024a088cb80d.pdf&gt;. Acesso em: 15 set. 2018</a:t>
+            </a:r>
+            <a:endParaRPr lang="pt-BR" sz="1800" dirty="0">
               <a:latin typeface="Arial" pitchFamily="34" charset="0"/>
               <a:cs typeface="Arial" pitchFamily="34" charset="0"/>
             </a:endParaRPr>
           </a:p>
         </p:txBody>
       </p:sp>
+      <p:sp>
+        <p:nvSpPr>
+          <p:cNvPr id="4" name="CaixaDeTexto 3">
+            <a:extLst>
+              <a:ext uri="{FF2B5EF4-FFF2-40B4-BE49-F238E27FC236}">
+                <a16:creationId xmlns:a16="http://schemas.microsoft.com/office/drawing/2014/main" id="{6002D911-071B-48C2-9C19-C3AA85B10A6D}"/>
+              </a:ext>
+            </a:extLst>
+          </p:cNvPr>
+          <p:cNvSpPr txBox="1"/>
+          <p:nvPr/>
+        </p:nvSpPr>
+        <p:spPr>
+          <a:xfrm>
+            <a:off x="480120" y="12304653"/>
+            <a:ext cx="2153154" cy="246221"/>
+          </a:xfrm>
+          <a:prstGeom prst="rect">
+            <a:avLst/>
+          </a:prstGeom>
+          <a:noFill/>
+        </p:spPr>
+        <p:txBody>
+          <a:bodyPr wrap="none" rtlCol="0">
+            <a:spAutoFit/>
+          </a:bodyPr>
+          <a:lstStyle/>
+          <a:p>
+            <a:r>
+              <a:rPr lang="pt-BR" sz="1000" dirty="0">
+                <a:latin typeface="Arial" panose="020B0604020202020204" pitchFamily="34" charset="0"/>
+                <a:cs typeface="Arial" panose="020B0604020202020204" pitchFamily="34" charset="0"/>
+              </a:rPr>
+              <a:t>Figura 1: Caixa ABS do </a:t>
+            </a:r>
+            <a:r>
+              <a:rPr lang="pt-BR" sz="1000" dirty="0" err="1">
+                <a:latin typeface="Arial" panose="020B0604020202020204" pitchFamily="34" charset="0"/>
+                <a:cs typeface="Arial" panose="020B0604020202020204" pitchFamily="34" charset="0"/>
+              </a:rPr>
+              <a:t>SpeedRun</a:t>
+            </a:r>
+            <a:endParaRPr lang="pt-BR" sz="1000" dirty="0">
+              <a:latin typeface="Arial" panose="020B0604020202020204" pitchFamily="34" charset="0"/>
+              <a:cs typeface="Arial" panose="020B0604020202020204" pitchFamily="34" charset="0"/>
+            </a:endParaRPr>
+          </a:p>
+        </p:txBody>
+      </p:sp>
+      <p:sp>
+        <p:nvSpPr>
+          <p:cNvPr id="5" name="CaixaDeTexto 4"/>
+          <p:cNvSpPr txBox="1"/>
+          <p:nvPr/>
+        </p:nvSpPr>
+        <p:spPr>
+          <a:xfrm>
+            <a:off x="5183861" y="4603245"/>
+            <a:ext cx="3123050" cy="246221"/>
+          </a:xfrm>
+          <a:prstGeom prst="rect">
+            <a:avLst/>
+          </a:prstGeom>
+          <a:noFill/>
+        </p:spPr>
+        <p:txBody>
+          <a:bodyPr wrap="square" rtlCol="0">
+            <a:spAutoFit/>
+          </a:bodyPr>
+          <a:lstStyle/>
+          <a:p>
+            <a:r>
+              <a:rPr lang="pt-BR" sz="1000" dirty="0">
+                <a:latin typeface="Arial" panose="020B0604020202020204" pitchFamily="34" charset="0"/>
+                <a:cs typeface="Arial" panose="020B0604020202020204" pitchFamily="34" charset="0"/>
+              </a:rPr>
+              <a:t>Equações que foram utilizadas para </a:t>
+            </a:r>
+            <a:r>
+              <a:rPr lang="pt-BR" sz="1000" dirty="0" err="1">
+                <a:latin typeface="Arial" panose="020B0604020202020204" pitchFamily="34" charset="0"/>
+                <a:cs typeface="Arial" panose="020B0604020202020204" pitchFamily="34" charset="0"/>
+              </a:rPr>
+              <a:t>trilateração</a:t>
+            </a:r>
+            <a:r>
+              <a:rPr lang="pt-BR" sz="1000" dirty="0">
+                <a:latin typeface="Arial" panose="020B0604020202020204" pitchFamily="34" charset="0"/>
+                <a:cs typeface="Arial" panose="020B0604020202020204" pitchFamily="34" charset="0"/>
+              </a:rPr>
+              <a:t>.</a:t>
+            </a:r>
+          </a:p>
+        </p:txBody>
+      </p:sp>
+      <mc:AlternateContent xmlns:mc="http://schemas.openxmlformats.org/markup-compatibility/2006">
+        <mc:Choice xmlns:a14="http://schemas.microsoft.com/office/drawing/2010/main" Requires="a14">
+          <p:sp>
+            <p:nvSpPr>
+              <p:cNvPr id="10" name="CaixaDeTexto 9">
+                <a:extLst>
+                  <a:ext uri="{FF2B5EF4-FFF2-40B4-BE49-F238E27FC236}">
+                    <a16:creationId xmlns:a16="http://schemas.microsoft.com/office/drawing/2014/main" id="{38CCDF2B-32D8-4FEB-A85E-820A9FE902F9}"/>
+                  </a:ext>
+                </a:extLst>
+              </p:cNvPr>
+              <p:cNvSpPr txBox="1"/>
+              <p:nvPr/>
+            </p:nvSpPr>
+            <p:spPr>
+              <a:xfrm>
+                <a:off x="4729162" y="3246930"/>
+                <a:ext cx="2016224" cy="217880"/>
+              </a:xfrm>
+              <a:prstGeom prst="rect">
+                <a:avLst/>
+              </a:prstGeom>
+              <a:noFill/>
+            </p:spPr>
+            <p:txBody>
+              <a:bodyPr wrap="square" lIns="0" tIns="0" rIns="0" bIns="0" rtlCol="0">
+                <a:spAutoFit/>
+              </a:bodyPr>
+              <a:lstStyle/>
+              <a:p>
+                <a14:m>
+                  <m:oMathPara xmlns:m="http://schemas.openxmlformats.org/officeDocument/2006/math">
+                    <m:oMathParaPr>
+                      <m:jc m:val="centerGroup"/>
+                    </m:oMathParaPr>
+                    <m:oMath xmlns:m="http://schemas.openxmlformats.org/officeDocument/2006/math">
+                      <m:sSubSup>
+                        <m:sSubSupPr>
+                          <m:ctrlPr>
+                            <a:rPr lang="pt-BR" sz="1400" i="1" smtClean="0">
+                              <a:latin typeface="Cambria Math" panose="02040503050406030204" pitchFamily="18" charset="0"/>
+                            </a:rPr>
+                          </m:ctrlPr>
+                        </m:sSubSupPr>
+                        <m:e>
+                          <m:r>
+                            <a:rPr lang="pt-BR" sz="1400" b="0" i="1" smtClean="0">
+                              <a:latin typeface="Cambria Math" panose="02040503050406030204" pitchFamily="18" charset="0"/>
+                            </a:rPr>
+                            <m:t>𝑑</m:t>
+                          </m:r>
+                        </m:e>
+                        <m:sub>
+                          <m:r>
+                            <a:rPr lang="pt-BR" sz="1400" b="0" i="1" smtClean="0">
+                              <a:latin typeface="Cambria Math" panose="02040503050406030204" pitchFamily="18" charset="0"/>
+                            </a:rPr>
+                            <m:t>1</m:t>
+                          </m:r>
+                        </m:sub>
+                        <m:sup>
+                          <m:r>
+                            <a:rPr lang="pt-BR" sz="1400" b="0" i="1" smtClean="0">
+                              <a:latin typeface="Cambria Math" panose="02040503050406030204" pitchFamily="18" charset="0"/>
+                            </a:rPr>
+                            <m:t>2</m:t>
+                          </m:r>
+                        </m:sup>
+                      </m:sSubSup>
+                      <m:r>
+                        <a:rPr lang="pt-BR" sz="1400" i="1" smtClean="0">
+                          <a:latin typeface="Cambria Math" panose="02040503050406030204" pitchFamily="18" charset="0"/>
+                        </a:rPr>
+                        <m:t>=</m:t>
+                      </m:r>
+                      <m:sSup>
+                        <m:sSupPr>
+                          <m:ctrlPr>
+                            <a:rPr lang="pt-BR" sz="1400" i="1" smtClean="0">
+                              <a:latin typeface="Cambria Math" panose="02040503050406030204" pitchFamily="18" charset="0"/>
+                            </a:rPr>
+                          </m:ctrlPr>
+                        </m:sSupPr>
+                        <m:e>
+                          <m:r>
+                            <a:rPr lang="pt-BR" sz="1400" b="0" i="1" smtClean="0">
+                              <a:latin typeface="Cambria Math" panose="02040503050406030204" pitchFamily="18" charset="0"/>
+                            </a:rPr>
+                            <m:t>𝑥</m:t>
+                          </m:r>
+                        </m:e>
+                        <m:sup>
+                          <m:r>
+                            <a:rPr lang="pt-BR" sz="1400" i="1" smtClean="0">
+                              <a:latin typeface="Cambria Math" panose="02040503050406030204" pitchFamily="18" charset="0"/>
+                            </a:rPr>
+                            <m:t>2</m:t>
+                          </m:r>
+                        </m:sup>
+                      </m:sSup>
+                      <m:r>
+                        <a:rPr lang="pt-BR" sz="1400" b="0" i="1" smtClean="0">
+                          <a:latin typeface="Cambria Math" panose="02040503050406030204" pitchFamily="18" charset="0"/>
+                        </a:rPr>
+                        <m:t>+</m:t>
+                      </m:r>
+                      <m:r>
+                        <a:rPr lang="pt-BR" sz="1400" b="0" i="1" smtClean="0">
+                          <a:latin typeface="Cambria Math" panose="02040503050406030204" pitchFamily="18" charset="0"/>
+                        </a:rPr>
+                        <m:t>𝑦</m:t>
+                      </m:r>
+                      <m:r>
+                        <a:rPr lang="pt-BR" sz="1400" b="0" i="1" smtClean="0">
+                          <a:latin typeface="Cambria Math" panose="02040503050406030204" pitchFamily="18" charset="0"/>
+                        </a:rPr>
+                        <m:t>²</m:t>
+                      </m:r>
+                    </m:oMath>
+                  </m:oMathPara>
+                </a14:m>
+                <a:endParaRPr lang="pt-BR" sz="1400" dirty="0"/>
+              </a:p>
+            </p:txBody>
+          </p:sp>
+        </mc:Choice>
+        <mc:Fallback>
+          <p:sp>
+            <p:nvSpPr>
+              <p:cNvPr id="10" name="CaixaDeTexto 9">
+                <a:extLst>
+                  <a:ext uri="{FF2B5EF4-FFF2-40B4-BE49-F238E27FC236}">
+                    <a16:creationId xmlns:a16="http://schemas.microsoft.com/office/drawing/2014/main" id="{38CCDF2B-32D8-4FEB-A85E-820A9FE902F9}"/>
+                  </a:ext>
+                </a:extLst>
+              </p:cNvPr>
+              <p:cNvSpPr txBox="1">
+                <a:spLocks noRot="1" noChangeAspect="1" noMove="1" noResize="1" noEditPoints="1" noAdjustHandles="1" noChangeArrowheads="1" noChangeShapeType="1" noTextEdit="1"/>
+              </p:cNvSpPr>
+              <p:nvPr/>
+            </p:nvSpPr>
+            <p:spPr>
+              <a:xfrm>
+                <a:off x="4729162" y="3246930"/>
+                <a:ext cx="2016224" cy="217880"/>
+              </a:xfrm>
+              <a:prstGeom prst="rect">
+                <a:avLst/>
+              </a:prstGeom>
+              <a:blipFill>
+                <a:blip r:embed="rId6"/>
+                <a:stretch>
+                  <a:fillRect t="-5714" b="-42857"/>
+                </a:stretch>
+              </a:blipFill>
+            </p:spPr>
+            <p:txBody>
+              <a:bodyPr/>
+              <a:lstStyle/>
+              <a:p>
+                <a:r>
+                  <a:rPr lang="pt-BR">
+                    <a:noFill/>
+                  </a:rPr>
+                  <a:t> </a:t>
+                </a:r>
+              </a:p>
+            </p:txBody>
+          </p:sp>
+        </mc:Fallback>
+      </mc:AlternateContent>
+      <mc:AlternateContent xmlns:mc="http://schemas.openxmlformats.org/markup-compatibility/2006">
+        <mc:Choice xmlns:a14="http://schemas.microsoft.com/office/drawing/2010/main" Requires="a14">
+          <p:sp>
+            <p:nvSpPr>
+              <p:cNvPr id="22" name="CaixaDeTexto 21">
+                <a:extLst>
+                  <a:ext uri="{FF2B5EF4-FFF2-40B4-BE49-F238E27FC236}">
+                    <a16:creationId xmlns:a16="http://schemas.microsoft.com/office/drawing/2014/main" id="{AB81BC82-FD1D-4CE4-A117-193F1C5EE65B}"/>
+                  </a:ext>
+                </a:extLst>
+              </p:cNvPr>
+              <p:cNvSpPr txBox="1"/>
+              <p:nvPr/>
+            </p:nvSpPr>
+            <p:spPr>
+              <a:xfrm>
+                <a:off x="6380329" y="3225343"/>
+                <a:ext cx="2016224" cy="218265"/>
+              </a:xfrm>
+              <a:prstGeom prst="rect">
+                <a:avLst/>
+              </a:prstGeom>
+              <a:noFill/>
+            </p:spPr>
+            <p:txBody>
+              <a:bodyPr wrap="square" lIns="0" tIns="0" rIns="0" bIns="0" rtlCol="0">
+                <a:spAutoFit/>
+              </a:bodyPr>
+              <a:lstStyle/>
+              <a:p>
+                <a14:m>
+                  <m:oMathPara xmlns:m="http://schemas.openxmlformats.org/officeDocument/2006/math">
+                    <m:oMathParaPr>
+                      <m:jc m:val="centerGroup"/>
+                    </m:oMathParaPr>
+                    <m:oMath xmlns:m="http://schemas.openxmlformats.org/officeDocument/2006/math">
+                      <m:sSubSup>
+                        <m:sSubSupPr>
+                          <m:ctrlPr>
+                            <a:rPr lang="pt-BR" sz="1400" i="1" smtClean="0">
+                              <a:latin typeface="Cambria Math" panose="02040503050406030204" pitchFamily="18" charset="0"/>
+                            </a:rPr>
+                          </m:ctrlPr>
+                        </m:sSubSupPr>
+                        <m:e>
+                          <m:r>
+                            <a:rPr lang="pt-BR" sz="1400" b="0" i="1" smtClean="0">
+                              <a:latin typeface="Cambria Math" panose="02040503050406030204" pitchFamily="18" charset="0"/>
+                            </a:rPr>
+                            <m:t>𝑑</m:t>
+                          </m:r>
+                        </m:e>
+                        <m:sub>
+                          <m:r>
+                            <a:rPr lang="pt-BR" sz="1400" b="0" i="1" smtClean="0">
+                              <a:latin typeface="Cambria Math" panose="02040503050406030204" pitchFamily="18" charset="0"/>
+                            </a:rPr>
+                            <m:t>2</m:t>
+                          </m:r>
+                        </m:sub>
+                        <m:sup>
+                          <m:r>
+                            <a:rPr lang="pt-BR" sz="1400" b="0" i="1" smtClean="0">
+                              <a:latin typeface="Cambria Math" panose="02040503050406030204" pitchFamily="18" charset="0"/>
+                            </a:rPr>
+                            <m:t>2</m:t>
+                          </m:r>
+                        </m:sup>
+                      </m:sSubSup>
+                      <m:r>
+                        <a:rPr lang="pt-BR" sz="1400" i="1" smtClean="0">
+                          <a:latin typeface="Cambria Math" panose="02040503050406030204" pitchFamily="18" charset="0"/>
+                        </a:rPr>
+                        <m:t>=</m:t>
+                      </m:r>
+                      <m:r>
+                        <a:rPr lang="pt-BR" sz="1400" b="0" i="1" smtClean="0">
+                          <a:latin typeface="Cambria Math" panose="02040503050406030204" pitchFamily="18" charset="0"/>
+                        </a:rPr>
+                        <m:t>(</m:t>
+                      </m:r>
+                      <m:sSup>
+                        <m:sSupPr>
+                          <m:ctrlPr>
+                            <a:rPr lang="pt-BR" sz="1400" i="1" smtClean="0">
+                              <a:latin typeface="Cambria Math" panose="02040503050406030204" pitchFamily="18" charset="0"/>
+                            </a:rPr>
+                          </m:ctrlPr>
+                        </m:sSupPr>
+                        <m:e>
+                          <m:r>
+                            <a:rPr lang="pt-BR" sz="1400" b="0" i="1" smtClean="0">
+                              <a:latin typeface="Cambria Math" panose="02040503050406030204" pitchFamily="18" charset="0"/>
+                            </a:rPr>
+                            <m:t>𝑥</m:t>
+                          </m:r>
+                          <m:r>
+                            <a:rPr lang="pt-BR" sz="1400" b="0" i="1" smtClean="0">
+                              <a:latin typeface="Cambria Math" panose="02040503050406030204" pitchFamily="18" charset="0"/>
+                            </a:rPr>
+                            <m:t>−</m:t>
+                          </m:r>
+                          <m:r>
+                            <a:rPr lang="pt-BR" sz="1400" b="0" i="1" smtClean="0">
+                              <a:latin typeface="Cambria Math" panose="02040503050406030204" pitchFamily="18" charset="0"/>
+                            </a:rPr>
+                            <m:t>𝑝</m:t>
+                          </m:r>
+                          <m:r>
+                            <a:rPr lang="pt-BR" sz="1400" b="0" i="1" smtClean="0">
+                              <a:latin typeface="Cambria Math" panose="02040503050406030204" pitchFamily="18" charset="0"/>
+                            </a:rPr>
+                            <m:t>)</m:t>
+                          </m:r>
+                        </m:e>
+                        <m:sup>
+                          <m:r>
+                            <a:rPr lang="pt-BR" sz="1400" i="1" smtClean="0">
+                              <a:latin typeface="Cambria Math" panose="02040503050406030204" pitchFamily="18" charset="0"/>
+                            </a:rPr>
+                            <m:t>2</m:t>
+                          </m:r>
+                        </m:sup>
+                      </m:sSup>
+                      <m:r>
+                        <a:rPr lang="pt-BR" sz="1400" b="0" i="1" smtClean="0">
+                          <a:latin typeface="Cambria Math" panose="02040503050406030204" pitchFamily="18" charset="0"/>
+                        </a:rPr>
+                        <m:t>+</m:t>
+                      </m:r>
+                      <m:r>
+                        <a:rPr lang="pt-BR" sz="1400" b="0" i="1" smtClean="0">
+                          <a:latin typeface="Cambria Math" panose="02040503050406030204" pitchFamily="18" charset="0"/>
+                        </a:rPr>
+                        <m:t>𝑦</m:t>
+                      </m:r>
+                      <m:r>
+                        <a:rPr lang="pt-BR" sz="1400" b="0" i="1" smtClean="0">
+                          <a:latin typeface="Cambria Math" panose="02040503050406030204" pitchFamily="18" charset="0"/>
+                        </a:rPr>
+                        <m:t>²</m:t>
+                      </m:r>
+                    </m:oMath>
+                  </m:oMathPara>
+                </a14:m>
+                <a:endParaRPr lang="pt-BR" sz="1400" dirty="0"/>
+              </a:p>
+            </p:txBody>
+          </p:sp>
+        </mc:Choice>
+        <mc:Fallback>
+          <p:sp>
+            <p:nvSpPr>
+              <p:cNvPr id="22" name="CaixaDeTexto 21">
+                <a:extLst>
+                  <a:ext uri="{FF2B5EF4-FFF2-40B4-BE49-F238E27FC236}">
+                    <a16:creationId xmlns:a16="http://schemas.microsoft.com/office/drawing/2014/main" id="{AB81BC82-FD1D-4CE4-A117-193F1C5EE65B}"/>
+                  </a:ext>
+                </a:extLst>
+              </p:cNvPr>
+              <p:cNvSpPr txBox="1">
+                <a:spLocks noRot="1" noChangeAspect="1" noMove="1" noResize="1" noEditPoints="1" noAdjustHandles="1" noChangeArrowheads="1" noChangeShapeType="1" noTextEdit="1"/>
+              </p:cNvSpPr>
+              <p:nvPr/>
+            </p:nvSpPr>
+            <p:spPr>
+              <a:xfrm>
+                <a:off x="6380329" y="3225343"/>
+                <a:ext cx="2016224" cy="218265"/>
+              </a:xfrm>
+              <a:prstGeom prst="rect">
+                <a:avLst/>
+              </a:prstGeom>
+              <a:blipFill>
+                <a:blip r:embed="rId7"/>
+                <a:stretch>
+                  <a:fillRect t="-5556" b="-38889"/>
+                </a:stretch>
+              </a:blipFill>
+            </p:spPr>
+            <p:txBody>
+              <a:bodyPr/>
+              <a:lstStyle/>
+              <a:p>
+                <a:r>
+                  <a:rPr lang="pt-BR">
+                    <a:noFill/>
+                  </a:rPr>
+                  <a:t> </a:t>
+                </a:r>
+              </a:p>
+            </p:txBody>
+          </p:sp>
+        </mc:Fallback>
+      </mc:AlternateContent>
+      <mc:AlternateContent xmlns:mc="http://schemas.openxmlformats.org/markup-compatibility/2006">
+        <mc:Choice xmlns:a14="http://schemas.microsoft.com/office/drawing/2010/main" Requires="a14">
+          <p:sp>
+            <p:nvSpPr>
+              <p:cNvPr id="23" name="CaixaDeTexto 22">
+                <a:extLst>
+                  <a:ext uri="{FF2B5EF4-FFF2-40B4-BE49-F238E27FC236}">
+                    <a16:creationId xmlns:a16="http://schemas.microsoft.com/office/drawing/2014/main" id="{FA9FB4C3-33DE-4627-B281-90EC90D1D8E1}"/>
+                  </a:ext>
+                </a:extLst>
+              </p:cNvPr>
+              <p:cNvSpPr txBox="1"/>
+              <p:nvPr/>
+            </p:nvSpPr>
+            <p:spPr>
+              <a:xfrm>
+                <a:off x="4812133" y="3628692"/>
+                <a:ext cx="2766962" cy="219355"/>
+              </a:xfrm>
+              <a:prstGeom prst="rect">
+                <a:avLst/>
+              </a:prstGeom>
+              <a:noFill/>
+            </p:spPr>
+            <p:txBody>
+              <a:bodyPr wrap="square" lIns="0" tIns="0" rIns="0" bIns="0" rtlCol="0">
+                <a:spAutoFit/>
+              </a:bodyPr>
+              <a:lstStyle/>
+              <a:p>
+                <a14:m>
+                  <m:oMathPara xmlns:m="http://schemas.openxmlformats.org/officeDocument/2006/math">
+                    <m:oMathParaPr>
+                      <m:jc m:val="centerGroup"/>
+                    </m:oMathParaPr>
+                    <m:oMath xmlns:m="http://schemas.openxmlformats.org/officeDocument/2006/math">
+                      <m:sSubSup>
+                        <m:sSubSupPr>
+                          <m:ctrlPr>
+                            <a:rPr lang="pt-BR" sz="1400" i="1" smtClean="0">
+                              <a:latin typeface="Cambria Math" panose="02040503050406030204" pitchFamily="18" charset="0"/>
+                            </a:rPr>
+                          </m:ctrlPr>
+                        </m:sSubSupPr>
+                        <m:e>
+                          <m:r>
+                            <a:rPr lang="pt-BR" sz="1400" b="0" i="1" smtClean="0">
+                              <a:latin typeface="Cambria Math" panose="02040503050406030204" pitchFamily="18" charset="0"/>
+                            </a:rPr>
+                            <m:t>𝑑</m:t>
+                          </m:r>
+                        </m:e>
+                        <m:sub>
+                          <m:r>
+                            <a:rPr lang="pt-BR" sz="1400" b="0" i="1" smtClean="0">
+                              <a:latin typeface="Cambria Math" panose="02040503050406030204" pitchFamily="18" charset="0"/>
+                            </a:rPr>
+                            <m:t>3</m:t>
+                          </m:r>
+                        </m:sub>
+                        <m:sup>
+                          <m:r>
+                            <a:rPr lang="pt-BR" sz="1400" b="0" i="1" smtClean="0">
+                              <a:latin typeface="Cambria Math" panose="02040503050406030204" pitchFamily="18" charset="0"/>
+                            </a:rPr>
+                            <m:t>2</m:t>
+                          </m:r>
+                        </m:sup>
+                      </m:sSubSup>
+                      <m:r>
+                        <a:rPr lang="pt-BR" sz="1400" i="1" smtClean="0">
+                          <a:latin typeface="Cambria Math" panose="02040503050406030204" pitchFamily="18" charset="0"/>
+                        </a:rPr>
+                        <m:t>=</m:t>
+                      </m:r>
+                      <m:r>
+                        <a:rPr lang="pt-BR" sz="1400" b="0" i="1" smtClean="0">
+                          <a:latin typeface="Cambria Math" panose="02040503050406030204" pitchFamily="18" charset="0"/>
+                        </a:rPr>
+                        <m:t>(</m:t>
+                      </m:r>
+                      <m:sSup>
+                        <m:sSupPr>
+                          <m:ctrlPr>
+                            <a:rPr lang="pt-BR" sz="1400" i="1" smtClean="0">
+                              <a:latin typeface="Cambria Math" panose="02040503050406030204" pitchFamily="18" charset="0"/>
+                            </a:rPr>
+                          </m:ctrlPr>
+                        </m:sSupPr>
+                        <m:e>
+                          <m:r>
+                            <a:rPr lang="pt-BR" sz="1400" b="0" i="1" smtClean="0">
+                              <a:latin typeface="Cambria Math" panose="02040503050406030204" pitchFamily="18" charset="0"/>
+                            </a:rPr>
+                            <m:t>𝑥</m:t>
+                          </m:r>
+                          <m:r>
+                            <a:rPr lang="pt-BR" sz="1400" b="0" i="1" smtClean="0">
+                              <a:latin typeface="Cambria Math" panose="02040503050406030204" pitchFamily="18" charset="0"/>
+                            </a:rPr>
+                            <m:t>−</m:t>
+                          </m:r>
+                          <m:r>
+                            <a:rPr lang="pt-BR" sz="1400" b="0" i="1" smtClean="0">
+                              <a:latin typeface="Cambria Math" panose="02040503050406030204" pitchFamily="18" charset="0"/>
+                            </a:rPr>
+                            <m:t>𝑞</m:t>
+                          </m:r>
+                          <m:r>
+                            <a:rPr lang="pt-BR" sz="1400" b="0" i="1" smtClean="0">
+                              <a:latin typeface="Cambria Math" panose="02040503050406030204" pitchFamily="18" charset="0"/>
+                            </a:rPr>
+                            <m:t>)</m:t>
+                          </m:r>
+                        </m:e>
+                        <m:sup>
+                          <m:r>
+                            <a:rPr lang="pt-BR" sz="1400" i="1" smtClean="0">
+                              <a:latin typeface="Cambria Math" panose="02040503050406030204" pitchFamily="18" charset="0"/>
+                            </a:rPr>
+                            <m:t>2</m:t>
+                          </m:r>
+                        </m:sup>
+                      </m:sSup>
+                      <m:r>
+                        <a:rPr lang="pt-BR" sz="1400" b="0" i="1" smtClean="0">
+                          <a:latin typeface="Cambria Math" panose="02040503050406030204" pitchFamily="18" charset="0"/>
+                        </a:rPr>
+                        <m:t>+(</m:t>
+                      </m:r>
+                      <m:r>
+                        <a:rPr lang="pt-BR" sz="1400" b="0" i="1" smtClean="0">
+                          <a:latin typeface="Cambria Math" panose="02040503050406030204" pitchFamily="18" charset="0"/>
+                        </a:rPr>
+                        <m:t>𝑦</m:t>
+                      </m:r>
+                      <m:r>
+                        <a:rPr lang="pt-BR" sz="1400" b="0" i="1" smtClean="0">
+                          <a:latin typeface="Cambria Math" panose="02040503050406030204" pitchFamily="18" charset="0"/>
+                        </a:rPr>
+                        <m:t>−</m:t>
+                      </m:r>
+                      <m:r>
+                        <a:rPr lang="pt-BR" sz="1400" b="0" i="1" smtClean="0">
+                          <a:latin typeface="Cambria Math" panose="02040503050406030204" pitchFamily="18" charset="0"/>
+                        </a:rPr>
+                        <m:t>𝑟</m:t>
+                      </m:r>
+                      <m:r>
+                        <a:rPr lang="pt-BR" sz="1400" b="0" i="1" smtClean="0">
+                          <a:latin typeface="Cambria Math" panose="02040503050406030204" pitchFamily="18" charset="0"/>
+                        </a:rPr>
+                        <m:t>)²</m:t>
+                      </m:r>
+                    </m:oMath>
+                  </m:oMathPara>
+                </a14:m>
+                <a:endParaRPr lang="pt-BR" sz="1400" dirty="0"/>
+              </a:p>
+            </p:txBody>
+          </p:sp>
+        </mc:Choice>
+        <mc:Fallback>
+          <p:sp>
+            <p:nvSpPr>
+              <p:cNvPr id="23" name="CaixaDeTexto 22">
+                <a:extLst>
+                  <a:ext uri="{FF2B5EF4-FFF2-40B4-BE49-F238E27FC236}">
+                    <a16:creationId xmlns:a16="http://schemas.microsoft.com/office/drawing/2014/main" id="{FA9FB4C3-33DE-4627-B281-90EC90D1D8E1}"/>
+                  </a:ext>
+                </a:extLst>
+              </p:cNvPr>
+              <p:cNvSpPr txBox="1">
+                <a:spLocks noRot="1" noChangeAspect="1" noMove="1" noResize="1" noEditPoints="1" noAdjustHandles="1" noChangeArrowheads="1" noChangeShapeType="1" noTextEdit="1"/>
+              </p:cNvSpPr>
+              <p:nvPr/>
+            </p:nvSpPr>
+            <p:spPr>
+              <a:xfrm>
+                <a:off x="4812133" y="3628692"/>
+                <a:ext cx="2766962" cy="219355"/>
+              </a:xfrm>
+              <a:prstGeom prst="rect">
+                <a:avLst/>
+              </a:prstGeom>
+              <a:blipFill>
+                <a:blip r:embed="rId8"/>
+                <a:stretch>
+                  <a:fillRect b="-36111"/>
+                </a:stretch>
+              </a:blipFill>
+            </p:spPr>
+            <p:txBody>
+              <a:bodyPr/>
+              <a:lstStyle/>
+              <a:p>
+                <a:r>
+                  <a:rPr lang="pt-BR">
+                    <a:noFill/>
+                  </a:rPr>
+                  <a:t> </a:t>
+                </a:r>
+              </a:p>
+            </p:txBody>
+          </p:sp>
+        </mc:Fallback>
+      </mc:AlternateContent>
+      <mc:AlternateContent xmlns:mc="http://schemas.openxmlformats.org/markup-compatibility/2006">
+        <mc:Choice xmlns:a14="http://schemas.microsoft.com/office/drawing/2010/main" Requires="a14">
+          <p:sp>
+            <p:nvSpPr>
+              <p:cNvPr id="19" name="CaixaDeTexto 18">
+                <a:extLst>
+                  <a:ext uri="{FF2B5EF4-FFF2-40B4-BE49-F238E27FC236}">
+                    <a16:creationId xmlns:a16="http://schemas.microsoft.com/office/drawing/2014/main" id="{AB55ACF5-A9D8-4C8C-A658-DB2C1F9F3CCF}"/>
+                  </a:ext>
+                </a:extLst>
+              </p:cNvPr>
+              <p:cNvSpPr txBox="1"/>
+              <p:nvPr/>
+            </p:nvSpPr>
+            <p:spPr>
+              <a:xfrm>
+                <a:off x="4872040" y="4006661"/>
+                <a:ext cx="2066925" cy="471924"/>
+              </a:xfrm>
+              <a:prstGeom prst="rect">
+                <a:avLst/>
+              </a:prstGeom>
+              <a:noFill/>
+            </p:spPr>
+            <p:txBody>
+              <a:bodyPr wrap="square" lIns="0" tIns="0" rIns="0" bIns="0" rtlCol="0">
+                <a:spAutoFit/>
+              </a:bodyPr>
+              <a:lstStyle/>
+              <a:p>
+                <a14:m>
+                  <m:oMathPara xmlns:m="http://schemas.openxmlformats.org/officeDocument/2006/math">
+                    <m:oMathParaPr>
+                      <m:jc m:val="centerGroup"/>
+                    </m:oMathParaPr>
+                    <m:oMath xmlns:m="http://schemas.openxmlformats.org/officeDocument/2006/math">
+                      <m:r>
+                        <a:rPr lang="pt-BR" sz="1400" b="0" i="1" smtClean="0">
+                          <a:latin typeface="Cambria Math" panose="02040503050406030204" pitchFamily="18" charset="0"/>
+                        </a:rPr>
+                        <m:t>𝑥</m:t>
+                      </m:r>
+                      <m:r>
+                        <a:rPr lang="pt-BR" sz="1400" i="1" smtClean="0">
+                          <a:latin typeface="Cambria Math" panose="02040503050406030204" pitchFamily="18" charset="0"/>
+                        </a:rPr>
+                        <m:t>=</m:t>
+                      </m:r>
+                      <m:f>
+                        <m:fPr>
+                          <m:ctrlPr>
+                            <a:rPr lang="pt-BR" sz="1400" b="0" i="1" smtClean="0">
+                              <a:latin typeface="Cambria Math" panose="02040503050406030204" pitchFamily="18" charset="0"/>
+                            </a:rPr>
+                          </m:ctrlPr>
+                        </m:fPr>
+                        <m:num>
+                          <m:sSubSup>
+                            <m:sSubSupPr>
+                              <m:ctrlPr>
+                                <a:rPr lang="pt-BR" sz="1400" i="1">
+                                  <a:latin typeface="Cambria Math" panose="02040503050406030204" pitchFamily="18" charset="0"/>
+                                </a:rPr>
+                              </m:ctrlPr>
+                            </m:sSubSupPr>
+                            <m:e>
+                              <m:r>
+                                <a:rPr lang="pt-BR" sz="1400" i="1">
+                                  <a:latin typeface="Cambria Math" panose="02040503050406030204" pitchFamily="18" charset="0"/>
+                                </a:rPr>
+                                <m:t>𝑑</m:t>
+                              </m:r>
+                            </m:e>
+                            <m:sub>
+                              <m:r>
+                                <a:rPr lang="pt-BR" sz="1400" i="1">
+                                  <a:latin typeface="Cambria Math" panose="02040503050406030204" pitchFamily="18" charset="0"/>
+                                </a:rPr>
+                                <m:t>1</m:t>
+                              </m:r>
+                            </m:sub>
+                            <m:sup>
+                              <m:r>
+                                <a:rPr lang="pt-BR" sz="1400" i="1">
+                                  <a:latin typeface="Cambria Math" panose="02040503050406030204" pitchFamily="18" charset="0"/>
+                                </a:rPr>
+                                <m:t>2</m:t>
+                              </m:r>
+                            </m:sup>
+                          </m:sSubSup>
+                          <m:r>
+                            <a:rPr lang="pt-BR" sz="1400" i="1">
+                              <a:latin typeface="Cambria Math" panose="02040503050406030204" pitchFamily="18" charset="0"/>
+                            </a:rPr>
+                            <m:t>− </m:t>
+                          </m:r>
+                          <m:sSubSup>
+                            <m:sSubSupPr>
+                              <m:ctrlPr>
+                                <a:rPr lang="pt-BR" sz="1400" i="1">
+                                  <a:latin typeface="Cambria Math" panose="02040503050406030204" pitchFamily="18" charset="0"/>
+                                </a:rPr>
+                              </m:ctrlPr>
+                            </m:sSubSupPr>
+                            <m:e>
+                              <m:r>
+                                <a:rPr lang="pt-BR" sz="1400" i="1">
+                                  <a:latin typeface="Cambria Math" panose="02040503050406030204" pitchFamily="18" charset="0"/>
+                                </a:rPr>
+                                <m:t>𝑑</m:t>
+                              </m:r>
+                            </m:e>
+                            <m:sub>
+                              <m:r>
+                                <a:rPr lang="pt-BR" sz="1400" i="1">
+                                  <a:latin typeface="Cambria Math" panose="02040503050406030204" pitchFamily="18" charset="0"/>
+                                </a:rPr>
+                                <m:t>2</m:t>
+                              </m:r>
+                            </m:sub>
+                            <m:sup>
+                              <m:r>
+                                <a:rPr lang="pt-BR" sz="1400" i="1">
+                                  <a:latin typeface="Cambria Math" panose="02040503050406030204" pitchFamily="18" charset="0"/>
+                                </a:rPr>
+                                <m:t>2</m:t>
+                              </m:r>
+                            </m:sup>
+                          </m:sSubSup>
+                          <m:r>
+                            <a:rPr lang="pt-BR" sz="1400" i="1">
+                              <a:latin typeface="Cambria Math" panose="02040503050406030204" pitchFamily="18" charset="0"/>
+                            </a:rPr>
+                            <m:t>+</m:t>
+                          </m:r>
+                          <m:r>
+                            <a:rPr lang="pt-BR" sz="1400" i="1">
+                              <a:latin typeface="Cambria Math" panose="02040503050406030204" pitchFamily="18" charset="0"/>
+                            </a:rPr>
+                            <m:t>𝑝</m:t>
+                          </m:r>
+                          <m:r>
+                            <a:rPr lang="pt-BR" sz="1400" i="1">
+                              <a:latin typeface="Cambria Math" panose="02040503050406030204" pitchFamily="18" charset="0"/>
+                            </a:rPr>
+                            <m:t>²</m:t>
+                          </m:r>
+                        </m:num>
+                        <m:den>
+                          <m:r>
+                            <a:rPr lang="pt-BR" sz="1400" b="0" i="1" smtClean="0">
+                              <a:latin typeface="Cambria Math" panose="02040503050406030204" pitchFamily="18" charset="0"/>
+                            </a:rPr>
+                            <m:t>2</m:t>
+                          </m:r>
+                          <m:r>
+                            <a:rPr lang="pt-BR" sz="1400" b="0" i="1" smtClean="0">
+                              <a:latin typeface="Cambria Math" panose="02040503050406030204" pitchFamily="18" charset="0"/>
+                            </a:rPr>
+                            <m:t>𝑝</m:t>
+                          </m:r>
+                        </m:den>
+                      </m:f>
+                    </m:oMath>
+                  </m:oMathPara>
+                </a14:m>
+                <a:endParaRPr lang="pt-BR" sz="1400" dirty="0"/>
+              </a:p>
+            </p:txBody>
+          </p:sp>
+        </mc:Choice>
+        <mc:Fallback>
+          <p:sp>
+            <p:nvSpPr>
+              <p:cNvPr id="19" name="CaixaDeTexto 18">
+                <a:extLst>
+                  <a:ext uri="{FF2B5EF4-FFF2-40B4-BE49-F238E27FC236}">
+                    <a16:creationId xmlns:a16="http://schemas.microsoft.com/office/drawing/2014/main" id="{AB55ACF5-A9D8-4C8C-A658-DB2C1F9F3CCF}"/>
+                  </a:ext>
+                </a:extLst>
+              </p:cNvPr>
+              <p:cNvSpPr txBox="1">
+                <a:spLocks noRot="1" noChangeAspect="1" noMove="1" noResize="1" noEditPoints="1" noAdjustHandles="1" noChangeArrowheads="1" noChangeShapeType="1" noTextEdit="1"/>
+              </p:cNvSpPr>
+              <p:nvPr/>
+            </p:nvSpPr>
+            <p:spPr>
+              <a:xfrm>
+                <a:off x="4872040" y="4006661"/>
+                <a:ext cx="2066925" cy="471924"/>
+              </a:xfrm>
+              <a:prstGeom prst="rect">
+                <a:avLst/>
+              </a:prstGeom>
+              <a:blipFill>
+                <a:blip r:embed="rId9"/>
+                <a:stretch>
+                  <a:fillRect/>
+                </a:stretch>
+              </a:blipFill>
+            </p:spPr>
+            <p:txBody>
+              <a:bodyPr/>
+              <a:lstStyle/>
+              <a:p>
+                <a:r>
+                  <a:rPr lang="pt-BR">
+                    <a:noFill/>
+                  </a:rPr>
+                  <a:t> </a:t>
+                </a:r>
+              </a:p>
+            </p:txBody>
+          </p:sp>
+        </mc:Fallback>
+      </mc:AlternateContent>
+      <mc:AlternateContent xmlns:mc="http://schemas.openxmlformats.org/markup-compatibility/2006">
+        <mc:Choice xmlns:a14="http://schemas.microsoft.com/office/drawing/2010/main" Requires="a14">
+          <p:sp>
+            <p:nvSpPr>
+              <p:cNvPr id="27" name="CaixaDeTexto 26">
+                <a:extLst>
+                  <a:ext uri="{FF2B5EF4-FFF2-40B4-BE49-F238E27FC236}">
+                    <a16:creationId xmlns:a16="http://schemas.microsoft.com/office/drawing/2014/main" id="{E209DC81-6C76-4334-AB3B-DE92653BDDDB}"/>
+                  </a:ext>
+                </a:extLst>
+              </p:cNvPr>
+              <p:cNvSpPr txBox="1"/>
+              <p:nvPr/>
+            </p:nvSpPr>
+            <p:spPr>
+              <a:xfrm>
+                <a:off x="6292155" y="3886846"/>
+                <a:ext cx="3403841" cy="636521"/>
+              </a:xfrm>
+              <a:prstGeom prst="rect">
+                <a:avLst/>
+              </a:prstGeom>
+              <a:noFill/>
+            </p:spPr>
+            <p:txBody>
+              <a:bodyPr wrap="square" lIns="0" tIns="0" rIns="0" bIns="0" rtlCol="0">
+                <a:spAutoFit/>
+              </a:bodyPr>
+              <a:lstStyle/>
+              <a:p>
+                <a14:m>
+                  <m:oMathPara xmlns:m="http://schemas.openxmlformats.org/officeDocument/2006/math">
+                    <m:oMathParaPr>
+                      <m:jc m:val="centerGroup"/>
+                    </m:oMathParaPr>
+                    <m:oMath xmlns:m="http://schemas.openxmlformats.org/officeDocument/2006/math">
+                      <m:r>
+                        <a:rPr lang="pt-BR" sz="1400" b="0" i="1" smtClean="0">
+                          <a:latin typeface="Cambria Math" panose="02040503050406030204" pitchFamily="18" charset="0"/>
+                        </a:rPr>
+                        <m:t>𝑦</m:t>
+                      </m:r>
+                      <m:r>
+                        <a:rPr lang="pt-BR" sz="1400" i="1" smtClean="0">
+                          <a:latin typeface="Cambria Math" panose="02040503050406030204" pitchFamily="18" charset="0"/>
+                        </a:rPr>
+                        <m:t>=</m:t>
+                      </m:r>
+                      <m:r>
+                        <a:rPr lang="pt-BR" sz="1400" b="0" i="1" smtClean="0">
+                          <a:latin typeface="Cambria Math" panose="02040503050406030204" pitchFamily="18" charset="0"/>
+                        </a:rPr>
+                        <m:t> </m:t>
+                      </m:r>
+                      <m:r>
+                        <a:rPr lang="pt-BR" sz="1400" b="0" i="1" smtClean="0">
+                          <a:latin typeface="Cambria Math" panose="02040503050406030204" pitchFamily="18" charset="0"/>
+                          <a:ea typeface="Cambria Math" panose="02040503050406030204" pitchFamily="18" charset="0"/>
+                        </a:rPr>
+                        <m:t>±</m:t>
+                      </m:r>
+                      <m:rad>
+                        <m:radPr>
+                          <m:degHide m:val="on"/>
+                          <m:ctrlPr>
+                            <a:rPr lang="pt-BR" sz="1400" i="1" smtClean="0">
+                              <a:latin typeface="Cambria Math" panose="02040503050406030204" pitchFamily="18" charset="0"/>
+                            </a:rPr>
+                          </m:ctrlPr>
+                        </m:radPr>
+                        <m:deg/>
+                        <m:e>
+                          <m:sSubSup>
+                            <m:sSubSupPr>
+                              <m:ctrlPr>
+                                <a:rPr lang="pt-BR" sz="1400" i="1">
+                                  <a:latin typeface="Cambria Math" panose="02040503050406030204" pitchFamily="18" charset="0"/>
+                                </a:rPr>
+                              </m:ctrlPr>
+                            </m:sSubSupPr>
+                            <m:e>
+                              <m:r>
+                                <a:rPr lang="pt-BR" sz="1400" i="1">
+                                  <a:latin typeface="Cambria Math" panose="02040503050406030204" pitchFamily="18" charset="0"/>
+                                </a:rPr>
+                                <m:t>𝑑</m:t>
+                              </m:r>
+                            </m:e>
+                            <m:sub>
+                              <m:r>
+                                <a:rPr lang="pt-BR" sz="1400" i="1">
+                                  <a:latin typeface="Cambria Math" panose="02040503050406030204" pitchFamily="18" charset="0"/>
+                                </a:rPr>
+                                <m:t>1</m:t>
+                              </m:r>
+                            </m:sub>
+                            <m:sup>
+                              <m:r>
+                                <a:rPr lang="pt-BR" sz="1400" i="1">
+                                  <a:latin typeface="Cambria Math" panose="02040503050406030204" pitchFamily="18" charset="0"/>
+                                </a:rPr>
+                                <m:t>2</m:t>
+                              </m:r>
+                            </m:sup>
+                          </m:sSubSup>
+                          <m:r>
+                            <a:rPr lang="pt-BR" sz="1400" b="0" i="1" smtClean="0">
+                              <a:latin typeface="Cambria Math" panose="02040503050406030204" pitchFamily="18" charset="0"/>
+                            </a:rPr>
+                            <m:t>−(</m:t>
+                          </m:r>
+                          <m:f>
+                            <m:fPr>
+                              <m:ctrlPr>
+                                <a:rPr lang="pt-BR" sz="1400" i="1">
+                                  <a:latin typeface="Cambria Math" panose="02040503050406030204" pitchFamily="18" charset="0"/>
+                                </a:rPr>
+                              </m:ctrlPr>
+                            </m:fPr>
+                            <m:num>
+                              <m:sSubSup>
+                                <m:sSubSupPr>
+                                  <m:ctrlPr>
+                                    <a:rPr lang="pt-BR" sz="1400" i="1">
+                                      <a:latin typeface="Cambria Math" panose="02040503050406030204" pitchFamily="18" charset="0"/>
+                                    </a:rPr>
+                                  </m:ctrlPr>
+                                </m:sSubSupPr>
+                                <m:e>
+                                  <m:r>
+                                    <a:rPr lang="pt-BR" sz="1400" i="1">
+                                      <a:latin typeface="Cambria Math" panose="02040503050406030204" pitchFamily="18" charset="0"/>
+                                    </a:rPr>
+                                    <m:t>𝑑</m:t>
+                                  </m:r>
+                                </m:e>
+                                <m:sub>
+                                  <m:r>
+                                    <a:rPr lang="pt-BR" sz="1400" i="1">
+                                      <a:latin typeface="Cambria Math" panose="02040503050406030204" pitchFamily="18" charset="0"/>
+                                    </a:rPr>
+                                    <m:t>1</m:t>
+                                  </m:r>
+                                </m:sub>
+                                <m:sup>
+                                  <m:r>
+                                    <a:rPr lang="pt-BR" sz="1400" i="1">
+                                      <a:latin typeface="Cambria Math" panose="02040503050406030204" pitchFamily="18" charset="0"/>
+                                    </a:rPr>
+                                    <m:t>2</m:t>
+                                  </m:r>
+                                </m:sup>
+                              </m:sSubSup>
+                              <m:r>
+                                <a:rPr lang="pt-BR" sz="1400" i="1">
+                                  <a:latin typeface="Cambria Math" panose="02040503050406030204" pitchFamily="18" charset="0"/>
+                                </a:rPr>
+                                <m:t>− </m:t>
+                              </m:r>
+                              <m:sSubSup>
+                                <m:sSubSupPr>
+                                  <m:ctrlPr>
+                                    <a:rPr lang="pt-BR" sz="1400" i="1">
+                                      <a:latin typeface="Cambria Math" panose="02040503050406030204" pitchFamily="18" charset="0"/>
+                                    </a:rPr>
+                                  </m:ctrlPr>
+                                </m:sSubSupPr>
+                                <m:e>
+                                  <m:r>
+                                    <a:rPr lang="pt-BR" sz="1400" i="1">
+                                      <a:latin typeface="Cambria Math" panose="02040503050406030204" pitchFamily="18" charset="0"/>
+                                    </a:rPr>
+                                    <m:t>𝑑</m:t>
+                                  </m:r>
+                                </m:e>
+                                <m:sub>
+                                  <m:r>
+                                    <a:rPr lang="pt-BR" sz="1400" i="1">
+                                      <a:latin typeface="Cambria Math" panose="02040503050406030204" pitchFamily="18" charset="0"/>
+                                    </a:rPr>
+                                    <m:t>2</m:t>
+                                  </m:r>
+                                </m:sub>
+                                <m:sup>
+                                  <m:r>
+                                    <a:rPr lang="pt-BR" sz="1400" i="1">
+                                      <a:latin typeface="Cambria Math" panose="02040503050406030204" pitchFamily="18" charset="0"/>
+                                    </a:rPr>
+                                    <m:t>2</m:t>
+                                  </m:r>
+                                </m:sup>
+                              </m:sSubSup>
+                              <m:r>
+                                <a:rPr lang="pt-BR" sz="1400" i="1">
+                                  <a:latin typeface="Cambria Math" panose="02040503050406030204" pitchFamily="18" charset="0"/>
+                                </a:rPr>
+                                <m:t>+</m:t>
+                              </m:r>
+                              <m:sSup>
+                                <m:sSupPr>
+                                  <m:ctrlPr>
+                                    <a:rPr lang="pt-BR" sz="1400" i="1">
+                                      <a:latin typeface="Cambria Math" panose="02040503050406030204" pitchFamily="18" charset="0"/>
+                                    </a:rPr>
+                                  </m:ctrlPr>
+                                </m:sSupPr>
+                                <m:e>
+                                  <m:r>
+                                    <a:rPr lang="pt-BR" sz="1400" i="1">
+                                      <a:latin typeface="Cambria Math" panose="02040503050406030204" pitchFamily="18" charset="0"/>
+                                    </a:rPr>
+                                    <m:t>𝑝</m:t>
+                                  </m:r>
+                                </m:e>
+                                <m:sup>
+                                  <m:r>
+                                    <a:rPr lang="pt-BR" sz="1400" i="1">
+                                      <a:latin typeface="Cambria Math" panose="02040503050406030204" pitchFamily="18" charset="0"/>
+                                    </a:rPr>
+                                    <m:t>2</m:t>
+                                  </m:r>
+                                </m:sup>
+                              </m:sSup>
+                            </m:num>
+                            <m:den>
+                              <m:r>
+                                <a:rPr lang="pt-BR" sz="1400" i="1">
+                                  <a:latin typeface="Cambria Math" panose="02040503050406030204" pitchFamily="18" charset="0"/>
+                                </a:rPr>
+                                <m:t>2</m:t>
+                              </m:r>
+                              <m:r>
+                                <a:rPr lang="pt-BR" sz="1400" i="1">
+                                  <a:latin typeface="Cambria Math" panose="02040503050406030204" pitchFamily="18" charset="0"/>
+                                </a:rPr>
+                                <m:t>𝑝</m:t>
+                              </m:r>
+                            </m:den>
+                          </m:f>
+                          <m:r>
+                            <a:rPr lang="pt-BR" sz="1400" b="0" i="1" smtClean="0">
+                              <a:latin typeface="Cambria Math" panose="02040503050406030204" pitchFamily="18" charset="0"/>
+                            </a:rPr>
+                            <m:t>)²</m:t>
+                          </m:r>
+                        </m:e>
+                      </m:rad>
+                    </m:oMath>
+                  </m:oMathPara>
+                </a14:m>
+                <a:endParaRPr lang="pt-BR" sz="1400" dirty="0"/>
+              </a:p>
+            </p:txBody>
+          </p:sp>
+        </mc:Choice>
+        <mc:Fallback>
+          <p:sp>
+            <p:nvSpPr>
+              <p:cNvPr id="27" name="CaixaDeTexto 26">
+                <a:extLst>
+                  <a:ext uri="{FF2B5EF4-FFF2-40B4-BE49-F238E27FC236}">
+                    <a16:creationId xmlns:a16="http://schemas.microsoft.com/office/drawing/2014/main" id="{E209DC81-6C76-4334-AB3B-DE92653BDDDB}"/>
+                  </a:ext>
+                </a:extLst>
+              </p:cNvPr>
+              <p:cNvSpPr txBox="1">
+                <a:spLocks noRot="1" noChangeAspect="1" noMove="1" noResize="1" noEditPoints="1" noAdjustHandles="1" noChangeArrowheads="1" noChangeShapeType="1" noTextEdit="1"/>
+              </p:cNvSpPr>
+              <p:nvPr/>
+            </p:nvSpPr>
+            <p:spPr>
+              <a:xfrm>
+                <a:off x="6292155" y="3886846"/>
+                <a:ext cx="3403841" cy="636521"/>
+              </a:xfrm>
+              <a:prstGeom prst="rect">
+                <a:avLst/>
+              </a:prstGeom>
+              <a:blipFill>
+                <a:blip r:embed="rId10"/>
+                <a:stretch>
+                  <a:fillRect/>
+                </a:stretch>
+              </a:blipFill>
+            </p:spPr>
+            <p:txBody>
+              <a:bodyPr/>
+              <a:lstStyle/>
+              <a:p>
+                <a:r>
+                  <a:rPr lang="pt-BR">
+                    <a:noFill/>
+                  </a:rPr>
+                  <a:t> </a:t>
+                </a:r>
+              </a:p>
+            </p:txBody>
+          </p:sp>
+        </mc:Fallback>
+      </mc:AlternateContent>
       <p:pic>
         <p:nvPicPr>
-          <p:cNvPr id="3" name="Imagem 2">
+          <p:cNvPr id="21" name="Imagem 20">
             <a:extLst>
               <a:ext uri="{FF2B5EF4-FFF2-40B4-BE49-F238E27FC236}">
-                <a16:creationId xmlns:a16="http://schemas.microsoft.com/office/drawing/2014/main" id="{7846B17D-4EDA-4E46-A935-DDB6A0332ABF}"/>
+                <a16:creationId xmlns:a16="http://schemas.microsoft.com/office/drawing/2014/main" id="{502D88D6-DE2B-431D-B1EB-6B57B96574E7}"/>
               </a:ext>
             </a:extLst>
           </p:cNvPr>
@@ -4931,7 +6293,7 @@
           <p:nvPr/>
         </p:nvPicPr>
         <p:blipFill>
-          <a:blip r:embed="rId4">
+          <a:blip r:embed="rId11">
             <a:extLst>
               <a:ext uri="{28A0092B-C50C-407E-A947-70E740481C1C}">
                 <a14:useLocalDpi xmlns:a14="http://schemas.microsoft.com/office/drawing/2010/main" val="0"/>
@@ -4944,8 +6306,8 @@
         </p:blipFill>
         <p:spPr>
           <a:xfrm>
-            <a:off x="480120" y="9606525"/>
-            <a:ext cx="3406973" cy="2666326"/>
+            <a:off x="5353653" y="4892803"/>
+            <a:ext cx="2395571" cy="2021559"/>
           </a:xfrm>
           <a:prstGeom prst="rect">
             <a:avLst/>
@@ -4954,10 +6316,10 @@
       </p:pic>
       <p:sp>
         <p:nvSpPr>
-          <p:cNvPr id="4" name="CaixaDeTexto 3">
+          <p:cNvPr id="30" name="CaixaDeTexto 29">
             <a:extLst>
               <a:ext uri="{FF2B5EF4-FFF2-40B4-BE49-F238E27FC236}">
-                <a16:creationId xmlns:a16="http://schemas.microsoft.com/office/drawing/2014/main" id="{6002D911-071B-48C2-9C19-C3AA85B10A6D}"/>
+                <a16:creationId xmlns:a16="http://schemas.microsoft.com/office/drawing/2014/main" id="{C148107C-BF7A-4645-8F31-B92714DF5329}"/>
               </a:ext>
             </a:extLst>
           </p:cNvPr>
@@ -4966,8 +6328,8 @@
         </p:nvSpPr>
         <p:spPr>
           <a:xfrm>
-            <a:off x="480120" y="12304653"/>
-            <a:ext cx="2153154" cy="246221"/>
+            <a:off x="4864076" y="6830600"/>
+            <a:ext cx="5177472" cy="400110"/>
           </a:xfrm>
           <a:prstGeom prst="rect">
             <a:avLst/>
@@ -4975,7 +6337,7 @@
           <a:noFill/>
         </p:spPr>
         <p:txBody>
-          <a:bodyPr wrap="none" rtlCol="0">
+          <a:bodyPr wrap="square" rtlCol="0">
             <a:spAutoFit/>
           </a:bodyPr>
           <a:lstStyle/>
@@ -4985,74 +6347,30 @@
                 <a:latin typeface="Arial" panose="020B0604020202020204" pitchFamily="34" charset="0"/>
                 <a:cs typeface="Arial" panose="020B0604020202020204" pitchFamily="34" charset="0"/>
               </a:rPr>
-              <a:t>Figura 1: Caixa ABS do </a:t>
-            </a:r>
-            <a:r>
-              <a:rPr lang="pt-BR" sz="1000" dirty="0" err="1">
-                <a:latin typeface="Arial" panose="020B0604020202020204" pitchFamily="34" charset="0"/>
-                <a:cs typeface="Arial" panose="020B0604020202020204" pitchFamily="34" charset="0"/>
+              <a:t>Figura 2: </a:t>
+            </a:r>
+            <a:r>
+              <a:rPr lang="pt-BR" sz="1000" dirty="0">
+                <a:latin typeface="Times New Roman" panose="02020603050405020304" pitchFamily="18" charset="0"/>
+                <a:cs typeface="Times New Roman" panose="02020603050405020304" pitchFamily="18" charset="0"/>
               </a:rPr>
-              <a:t>SpeedRun</a:t>
-            </a:r>
-            <a:endParaRPr lang="pt-BR" sz="1000" dirty="0">
-              <a:latin typeface="Arial" panose="020B0604020202020204" pitchFamily="34" charset="0"/>
-              <a:cs typeface="Arial" panose="020B0604020202020204" pitchFamily="34" charset="0"/>
-            </a:endParaRPr>
-          </a:p>
-        </p:txBody>
-      </p:sp>
-      <p:pic>
-        <p:nvPicPr>
-          <p:cNvPr id="2" name="Imagem 1"/>
-          <p:cNvPicPr>
-            <a:picLocks noChangeAspect="1"/>
-          </p:cNvPicPr>
-          <p:nvPr/>
-        </p:nvPicPr>
-        <p:blipFill>
-          <a:blip r:embed="rId5"/>
-          <a:stretch>
-            <a:fillRect/>
-          </a:stretch>
-        </p:blipFill>
-        <p:spPr>
-          <a:xfrm>
-            <a:off x="4845901" y="3426146"/>
-            <a:ext cx="4240711" cy="3415578"/>
-          </a:xfrm>
-          <a:prstGeom prst="rect">
-            <a:avLst/>
-          </a:prstGeom>
-        </p:spPr>
-      </p:pic>
-      <p:sp>
-        <p:nvSpPr>
-          <p:cNvPr id="5" name="CaixaDeTexto 4"/>
-          <p:cNvSpPr txBox="1"/>
-          <p:nvPr/>
-        </p:nvSpPr>
-        <p:spPr>
-          <a:xfrm>
-            <a:off x="4843212" y="6841724"/>
-            <a:ext cx="3123050" cy="246221"/>
-          </a:xfrm>
-          <a:prstGeom prst="rect">
-            <a:avLst/>
-          </a:prstGeom>
-          <a:noFill/>
-        </p:spPr>
-        <p:txBody>
-          <a:bodyPr wrap="square" rtlCol="0">
-            <a:spAutoFit/>
-          </a:bodyPr>
-          <a:lstStyle/>
-          <a:p>
+              <a:t>http://jwilson.coe.uga.edu/EMAT6680Fa05/Schultz/6690/Barn_GPS</a:t>
+            </a:r>
+          </a:p>
+          <a:p>
+            <a:r>
+              <a:rPr lang="pt-BR" sz="1000" dirty="0">
+                <a:latin typeface="Times New Roman" panose="02020603050405020304" pitchFamily="18" charset="0"/>
+                <a:cs typeface="Times New Roman" panose="02020603050405020304" pitchFamily="18" charset="0"/>
+              </a:rPr>
+              <a:t>/Barn_GPS.html</a:t>
+            </a:r>
             <a:r>
               <a:rPr lang="pt-BR" sz="1000" dirty="0">
                 <a:latin typeface="Arial" panose="020B0604020202020204" pitchFamily="34" charset="0"/>
                 <a:cs typeface="Arial" panose="020B0604020202020204" pitchFamily="34" charset="0"/>
               </a:rPr>
-              <a:t>Figura 2: Diagrama de funcionamento do protótipo</a:t>
+              <a:t>.</a:t>
             </a:r>
           </a:p>
         </p:txBody>

</xml_diff>